<commit_message>
Update SB 5yr forecast viz -writup.pptx
</commit_message>
<xml_diff>
--- a/SB 5yr forecast viz -writup.pptx
+++ b/SB 5yr forecast viz -writup.pptx
@@ -5493,7 +5493,7 @@
         <p:spPr>
           <a:xfrm>
             <a:off x="990605" y="1122274"/>
-            <a:ext cx="5383969" cy="5724644"/>
+            <a:ext cx="5383969" cy="5355312"/>
           </a:xfrm>
           <a:prstGeom prst="rect">
             <a:avLst/>
@@ -5515,7 +5515,7 @@
           <a:p>
             <a:r>
               <a:rPr lang="en-US" sz="1100" dirty="0"/>
-              <a:t>Property tax, by far the largest source of discretionary revenue, is expected to experience moderate to strong growth throughout the forecast period. However, some growth rate volatility is expected.</a:t>
+              <a:t>Property tax, by far the largest source of discretionary revenue, is expected to experience moderate to strong growth throughout the forecast period. </a:t>
             </a:r>
           </a:p>
           <a:p>
@@ -5580,11 +5580,11 @@
           <a:p>
             <a:r>
               <a:rPr lang="en-US" sz="1100" dirty="0"/>
-              <a:t>For the current forecast, all other revenue (Other Revenue) is projected based on the assumption of Property Tax revenue continuing to constitute 76% of total discretionary revenue. This allows for an average annual growth rate of 3.1% for Other Revenue. These projections, as well as those for total discretionary revenue and the financial position should be viewed as less precise estimates than </a:t>
+              <a:t>For the current forecast, all other revenue (Other Revenue) is projected based on the assumption of Property Tax revenue continuing to constitute 76% of total discretionary revenue. This allows for an average annual growth rate of 3.1% for Other Revenue. These projections, as well as those for total discretionary revenue and the financial position should be viewed as less precise estimates than those for primary revenue sources</a:t>
             </a:r>
             <a:r>
               <a:rPr lang="en-US" sz="1200" dirty="0"/>
-              <a:t>those for primary revenue sources, </a:t>
+              <a:t>, </a:t>
             </a:r>
             <a:r>
               <a:rPr lang="en-US" sz="1100" dirty="0"/>
@@ -5622,7 +5622,7 @@
         </p:nvSpPr>
         <p:spPr>
           <a:xfrm>
-            <a:off x="990606" y="6273001"/>
+            <a:off x="990606" y="6213732"/>
             <a:ext cx="5383968" cy="784830"/>
           </a:xfrm>
           <a:prstGeom prst="rect">
@@ -6115,7 +6115,7 @@
         <p:spPr>
           <a:xfrm>
             <a:off x="995250" y="5558148"/>
-            <a:ext cx="5510973" cy="3308598"/>
+            <a:ext cx="5510973" cy="2631490"/>
           </a:xfrm>
           <a:prstGeom prst="rect">
             <a:avLst/>
@@ -6148,7 +6148,7 @@
             </a:pPr>
             <a:r>
               <a:rPr lang="en-US" sz="1100" dirty="0"/>
-              <a:t>FY 2021-2022 is expected to be a year of strong revenue growth in Property Tax and 	TOT, bolstering current surpluses. This is projected to be proceeded by a return to 	relatively stable and moderate growth. </a:t>
+              <a:t>FY 2021-2022 is expected to be a year of strong revenue growth in Property Tax and TOT, bolstering current surpluses. This is projected to be proceeded by a return to 	relatively stable and moderate growth. </a:t>
             </a:r>
           </a:p>
           <a:p>
@@ -6165,19 +6165,6 @@
             <a:r>
               <a:rPr lang="en-US" sz="1100" dirty="0"/>
               <a:t>As the discretionary General Fund relies heavily on property tax revenue (accounting for over three quarters of total discretionary revenue), it is vulnerable to any volatility in this revenue source. Impacts of relevant policy (such as Prop 19) should be closely monitored. </a:t>
-            </a:r>
-          </a:p>
-          <a:p>
-            <a:endParaRPr lang="en-US" sz="1100" dirty="0"/>
-          </a:p>
-          <a:p>
-            <a:pPr marL="171450" indent="-171450">
-              <a:buFont typeface="Arial" panose="020B0604020202020204" pitchFamily="34" charset="0"/>
-              <a:buChar char="•"/>
-            </a:pPr>
-            <a:r>
-              <a:rPr lang="en-US" sz="1100" dirty="0"/>
-              <a:t>Revenue from sources other than Property Tax, Sales Tax and TOT make up a significant portion of discretionary revenue, thus the financial position of the General Fund is also somewhat vulnerable to volatility in these sources. </a:t>
             </a:r>
           </a:p>
           <a:p>
@@ -6926,14 +6913,14 @@
           <p:nvPr>
             <p:extLst>
               <p:ext uri="{D42A27DB-BD31-4B8C-83A1-F6EECF244321}">
-                <p14:modId xmlns:p14="http://schemas.microsoft.com/office/powerpoint/2010/main" val="2527883249"/>
+                <p14:modId xmlns:p14="http://schemas.microsoft.com/office/powerpoint/2010/main" val="847578487"/>
               </p:ext>
             </p:extLst>
           </p:nvPr>
         </p:nvGraphicFramePr>
         <p:xfrm>
-          <a:off x="1128074" y="2119223"/>
-          <a:ext cx="5111862" cy="1710102"/>
+          <a:off x="1128074" y="2164965"/>
+          <a:ext cx="5111862" cy="1676586"/>
         </p:xfrm>
         <a:graphic>
           <a:graphicData uri="http://schemas.openxmlformats.org/drawingml/2006/table">
@@ -6985,7 +6972,7 @@
                   </a:extLst>
                 </a:gridCol>
               </a:tblGrid>
-              <a:tr h="378608">
+              <a:tr h="444970">
                 <a:tc>
                   <a:txBody>
                     <a:bodyPr/>
@@ -6993,7 +6980,11 @@
                     <a:p>
                       <a:pPr algn="ctr"/>
                       <a:r>
-                        <a:rPr lang="en-US" sz="800" dirty="0"/>
+                        <a:rPr lang="en-US" sz="800" b="0" dirty="0">
+                          <a:solidFill>
+                            <a:schemeClr val="tx1"/>
+                          </a:solidFill>
+                        </a:rPr>
                         <a:t>Fiscal Year</a:t>
                       </a:r>
                     </a:p>
@@ -7013,7 +7004,11 @@
                     <a:p>
                       <a:pPr algn="ctr"/>
                       <a:r>
-                        <a:rPr lang="en-US" sz="800" dirty="0"/>
+                        <a:rPr lang="en-US" sz="800" b="0" dirty="0">
+                          <a:solidFill>
+                            <a:schemeClr val="tx1"/>
+                          </a:solidFill>
+                        </a:rPr>
                         <a:t>Property Tax Revenue</a:t>
                       </a:r>
                     </a:p>
@@ -7033,7 +7028,11 @@
                     <a:p>
                       <a:pPr algn="ctr"/>
                       <a:r>
-                        <a:rPr lang="en-US" sz="800" dirty="0"/>
+                        <a:rPr lang="en-US" sz="800" b="0" dirty="0">
+                          <a:solidFill>
+                            <a:schemeClr val="tx1"/>
+                          </a:solidFill>
+                        </a:rPr>
                         <a:t>Transient Occupancy Tax Revenue</a:t>
                       </a:r>
                     </a:p>
@@ -7053,7 +7052,11 @@
                     <a:p>
                       <a:pPr algn="ctr"/>
                       <a:r>
-                        <a:rPr lang="en-US" sz="800" dirty="0"/>
+                        <a:rPr lang="en-US" sz="800" b="0" dirty="0">
+                          <a:solidFill>
+                            <a:schemeClr val="tx1"/>
+                          </a:solidFill>
+                        </a:rPr>
                         <a:t>Sales Tax Revenue</a:t>
                       </a:r>
                     </a:p>
@@ -7073,14 +7076,22 @@
                     <a:p>
                       <a:pPr algn="ctr"/>
                       <a:r>
-                        <a:rPr lang="en-US" sz="800" dirty="0"/>
+                        <a:rPr lang="en-US" sz="800" b="0" dirty="0">
+                          <a:solidFill>
+                            <a:schemeClr val="tx1"/>
+                          </a:solidFill>
+                        </a:rPr>
                         <a:t>Other </a:t>
                       </a:r>
                     </a:p>
                     <a:p>
                       <a:pPr algn="ctr"/>
                       <a:r>
-                        <a:rPr lang="en-US" sz="800" dirty="0"/>
+                        <a:rPr lang="en-US" sz="800" b="0" dirty="0">
+                          <a:solidFill>
+                            <a:schemeClr val="tx1"/>
+                          </a:solidFill>
+                        </a:rPr>
                         <a:t>Revenue</a:t>
                       </a:r>
                     </a:p>
@@ -7100,14 +7111,22 @@
                     <a:p>
                       <a:pPr algn="ctr"/>
                       <a:r>
-                        <a:rPr lang="en-US" sz="800" dirty="0"/>
+                        <a:rPr lang="en-US" sz="800" b="0" dirty="0">
+                          <a:solidFill>
+                            <a:schemeClr val="tx1"/>
+                          </a:solidFill>
+                        </a:rPr>
                         <a:t>Total </a:t>
                       </a:r>
                     </a:p>
                     <a:p>
                       <a:pPr algn="ctr"/>
                       <a:r>
-                        <a:rPr lang="en-US" sz="800" dirty="0"/>
+                        <a:rPr lang="en-US" sz="800" b="0" dirty="0">
+                          <a:solidFill>
+                            <a:schemeClr val="tx1"/>
+                          </a:solidFill>
+                        </a:rPr>
                         <a:t>Revenue</a:t>
                       </a:r>
                     </a:p>
@@ -7126,7 +7145,7 @@
                   </a:ext>
                 </a:extLst>
               </a:tr>
-              <a:tr h="208817">
+              <a:tr h="203231">
                 <a:tc>
                   <a:txBody>
                     <a:bodyPr/>
@@ -7134,15 +7153,19 @@
                     <a:p>
                       <a:pPr algn="ctr"/>
                       <a:r>
-                        <a:rPr lang="en-US" sz="700" dirty="0"/>
+                        <a:rPr lang="en-US" sz="700" b="0" dirty="0">
+                          <a:solidFill>
+                            <a:schemeClr val="tx1"/>
+                          </a:solidFill>
+                        </a:rPr>
                         <a:t>2020-2021</a:t>
                       </a:r>
                     </a:p>
                   </a:txBody>
                   <a:tcPr anchor="ctr">
                     <a:solidFill>
-                      <a:srgbClr val="77A6BA">
-                        <a:alpha val="25098"/>
+                      <a:srgbClr val="698CB0">
+                        <a:alpha val="76078"/>
                       </a:srgbClr>
                     </a:solidFill>
                   </a:tcPr>
@@ -7258,7 +7281,7 @@
                     <a:p>
                       <a:pPr algn="ctr" fontAlgn="b"/>
                       <a:r>
-                        <a:rPr lang="en-US" sz="700" b="0" i="0" u="none" strike="noStrike">
+                        <a:rPr lang="en-US" sz="700" b="1" i="0" u="none" strike="noStrike">
                           <a:solidFill>
                             <a:srgbClr val="000000"/>
                           </a:solidFill>
@@ -7283,7 +7306,7 @@
                   </a:ext>
                 </a:extLst>
               </a:tr>
-              <a:tr h="208817">
+              <a:tr h="203231">
                 <a:tc>
                   <a:txBody>
                     <a:bodyPr/>
@@ -7291,7 +7314,11 @@
                     <a:p>
                       <a:pPr algn="ctr"/>
                       <a:r>
-                        <a:rPr lang="en-US" sz="700" dirty="0"/>
+                        <a:rPr lang="en-US" sz="700" b="0" dirty="0">
+                          <a:solidFill>
+                            <a:schemeClr val="tx1"/>
+                          </a:solidFill>
+                        </a:rPr>
                         <a:t>2021-2022</a:t>
                       </a:r>
                     </a:p>
@@ -7299,7 +7326,7 @@
                   <a:tcPr anchor="ctr">
                     <a:solidFill>
                       <a:srgbClr val="698CB0">
-                        <a:alpha val="25098"/>
+                        <a:alpha val="76078"/>
                       </a:srgbClr>
                     </a:solidFill>
                   </a:tcPr>
@@ -7415,7 +7442,7 @@
                     <a:p>
                       <a:pPr algn="ctr" fontAlgn="b"/>
                       <a:r>
-                        <a:rPr lang="en-US" sz="700" b="0" i="0" u="none" strike="noStrike">
+                        <a:rPr lang="en-US" sz="700" b="1" i="0" u="none" strike="noStrike">
                           <a:solidFill>
                             <a:srgbClr val="000000"/>
                           </a:solidFill>
@@ -7440,7 +7467,7 @@
                   </a:ext>
                 </a:extLst>
               </a:tr>
-              <a:tr h="208817">
+              <a:tr h="203231">
                 <a:tc>
                   <a:txBody>
                     <a:bodyPr/>
@@ -7448,15 +7475,19 @@
                     <a:p>
                       <a:pPr algn="ctr"/>
                       <a:r>
-                        <a:rPr lang="en-US" sz="700" dirty="0"/>
+                        <a:rPr lang="en-US" sz="700" b="0" dirty="0">
+                          <a:solidFill>
+                            <a:schemeClr val="tx1"/>
+                          </a:solidFill>
+                        </a:rPr>
                         <a:t>2022-2023</a:t>
                       </a:r>
                     </a:p>
                   </a:txBody>
                   <a:tcPr anchor="ctr">
                     <a:solidFill>
-                      <a:srgbClr val="77A6BA">
-                        <a:alpha val="25098"/>
+                      <a:srgbClr val="698CB0">
+                        <a:alpha val="76078"/>
                       </a:srgbClr>
                     </a:solidFill>
                   </a:tcPr>
@@ -7572,7 +7603,7 @@
                     <a:p>
                       <a:pPr algn="ctr" fontAlgn="b"/>
                       <a:r>
-                        <a:rPr lang="en-US" sz="700" b="0" i="0" u="none" strike="noStrike">
+                        <a:rPr lang="en-US" sz="700" b="1" i="0" u="none" strike="noStrike">
                           <a:solidFill>
                             <a:srgbClr val="000000"/>
                           </a:solidFill>
@@ -7597,7 +7628,7 @@
                   </a:ext>
                 </a:extLst>
               </a:tr>
-              <a:tr h="208817">
+              <a:tr h="203231">
                 <a:tc>
                   <a:txBody>
                     <a:bodyPr/>
@@ -7605,7 +7636,11 @@
                     <a:p>
                       <a:pPr algn="ctr"/>
                       <a:r>
-                        <a:rPr lang="en-US" sz="700" dirty="0"/>
+                        <a:rPr lang="en-US" sz="700" b="0" dirty="0">
+                          <a:solidFill>
+                            <a:schemeClr val="tx1"/>
+                          </a:solidFill>
+                        </a:rPr>
                         <a:t>2023-2024</a:t>
                       </a:r>
                     </a:p>
@@ -7613,7 +7648,7 @@
                   <a:tcPr anchor="ctr">
                     <a:solidFill>
                       <a:srgbClr val="698CB0">
-                        <a:alpha val="25098"/>
+                        <a:alpha val="76078"/>
                       </a:srgbClr>
                     </a:solidFill>
                   </a:tcPr>
@@ -7729,7 +7764,7 @@
                     <a:p>
                       <a:pPr algn="ctr" fontAlgn="b"/>
                       <a:r>
-                        <a:rPr lang="en-US" sz="700" b="0" i="0" u="none" strike="noStrike" dirty="0">
+                        <a:rPr lang="en-US" sz="700" b="1" i="0" u="none" strike="noStrike" dirty="0">
                           <a:solidFill>
                             <a:srgbClr val="000000"/>
                           </a:solidFill>
@@ -7754,7 +7789,7 @@
                   </a:ext>
                 </a:extLst>
               </a:tr>
-              <a:tr h="208817">
+              <a:tr h="203231">
                 <a:tc>
                   <a:txBody>
                     <a:bodyPr/>
@@ -7762,15 +7797,19 @@
                     <a:p>
                       <a:pPr algn="ctr"/>
                       <a:r>
-                        <a:rPr lang="en-US" sz="700" dirty="0"/>
+                        <a:rPr lang="en-US" sz="700" b="0" dirty="0">
+                          <a:solidFill>
+                            <a:schemeClr val="tx1"/>
+                          </a:solidFill>
+                        </a:rPr>
                         <a:t>2024-2025</a:t>
                       </a:r>
                     </a:p>
                   </a:txBody>
                   <a:tcPr anchor="ctr">
                     <a:solidFill>
-                      <a:srgbClr val="77A6BA">
-                        <a:alpha val="25098"/>
+                      <a:srgbClr val="698CB0">
+                        <a:alpha val="76078"/>
                       </a:srgbClr>
                     </a:solidFill>
                   </a:tcPr>
@@ -7886,7 +7925,7 @@
                     <a:p>
                       <a:pPr algn="ctr" fontAlgn="b"/>
                       <a:r>
-                        <a:rPr lang="en-US" sz="700" b="0" i="0" u="none" strike="noStrike">
+                        <a:rPr lang="en-US" sz="700" b="1" i="0" u="none" strike="noStrike">
                           <a:solidFill>
                             <a:srgbClr val="000000"/>
                           </a:solidFill>
@@ -7911,7 +7950,7 @@
                   </a:ext>
                 </a:extLst>
               </a:tr>
-              <a:tr h="208817">
+              <a:tr h="203231">
                 <a:tc>
                   <a:txBody>
                     <a:bodyPr/>
@@ -7919,7 +7958,11 @@
                     <a:p>
                       <a:pPr algn="ctr"/>
                       <a:r>
-                        <a:rPr lang="en-US" sz="700" dirty="0"/>
+                        <a:rPr lang="en-US" sz="700" b="0" dirty="0">
+                          <a:solidFill>
+                            <a:schemeClr val="tx1"/>
+                          </a:solidFill>
+                        </a:rPr>
                         <a:t>2025-2026</a:t>
                       </a:r>
                     </a:p>
@@ -7927,7 +7970,7 @@
                   <a:tcPr anchor="ctr">
                     <a:solidFill>
                       <a:srgbClr val="698CB0">
-                        <a:alpha val="25098"/>
+                        <a:alpha val="76078"/>
                       </a:srgbClr>
                     </a:solidFill>
                   </a:tcPr>
@@ -8043,7 +8086,7 @@
                     <a:p>
                       <a:pPr algn="ctr" fontAlgn="b"/>
                       <a:r>
-                        <a:rPr lang="en-US" sz="700" b="0" i="0" u="none" strike="noStrike" dirty="0">
+                        <a:rPr lang="en-US" sz="700" b="1" i="0" u="none" strike="noStrike" dirty="0">
                           <a:solidFill>
                             <a:srgbClr val="000000"/>
                           </a:solidFill>
@@ -8086,8 +8129,8 @@
         </p:nvSpPr>
         <p:spPr>
           <a:xfrm>
-            <a:off x="1029756" y="1800693"/>
-            <a:ext cx="5262979" cy="276999"/>
+            <a:off x="1052510" y="1645670"/>
+            <a:ext cx="5210180" cy="430887"/>
           </a:xfrm>
           <a:prstGeom prst="rect">
             <a:avLst/>
@@ -8095,22 +8138,22 @@
           <a:noFill/>
         </p:spPr>
         <p:txBody>
-          <a:bodyPr wrap="none" rtlCol="0">
+          <a:bodyPr wrap="square" rtlCol="0">
             <a:spAutoFit/>
           </a:bodyPr>
           <a:lstStyle/>
           <a:p>
-            <a:r>
-              <a:rPr lang="en-US" sz="1200" dirty="0"/>
-              <a:t>Table 1.    </a:t>
-            </a:r>
-            <a:r>
-              <a:rPr lang="en-US" sz="1200" b="1" dirty="0"/>
-              <a:t>Discretionary General Fund Revenue by Source (In Millions of Dollars)</a:t>
-            </a:r>
-            <a:r>
-              <a:rPr lang="en-US" sz="1200" dirty="0"/>
-              <a:t>	</a:t>
+            <a:pPr algn="ctr"/>
+            <a:r>
+              <a:rPr lang="en-US" sz="1100" b="1" dirty="0"/>
+              <a:t>Discretionary General Fund </a:t>
+            </a:r>
+          </a:p>
+          <a:p>
+            <a:pPr algn="ctr"/>
+            <a:r>
+              <a:rPr lang="en-US" sz="1100" b="1" dirty="0"/>
+              <a:t>    Projected Revenue by Source (In Millions of Dollars)	</a:t>
             </a:r>
           </a:p>
         </p:txBody>
@@ -8223,6 +8266,41 @@
             <a:r>
               <a:rPr lang="en-US" sz="1000" dirty="0"/>
               <a:t>4</a:t>
+            </a:r>
+          </a:p>
+        </p:txBody>
+      </p:sp>
+      <p:sp>
+        <p:nvSpPr>
+          <p:cNvPr id="12" name="TextBox 11">
+            <a:extLst>
+              <a:ext uri="{FF2B5EF4-FFF2-40B4-BE49-F238E27FC236}">
+                <a16:creationId xmlns:a16="http://schemas.microsoft.com/office/drawing/2014/main" id="{97A27DCE-5B7A-D246-ADAE-F391EA51636B}"/>
+              </a:ext>
+            </a:extLst>
+          </p:cNvPr>
+          <p:cNvSpPr txBox="1"/>
+          <p:nvPr/>
+        </p:nvSpPr>
+        <p:spPr>
+          <a:xfrm>
+            <a:off x="1085888" y="1580646"/>
+            <a:ext cx="636713" cy="261610"/>
+          </a:xfrm>
+          <a:prstGeom prst="rect">
+            <a:avLst/>
+          </a:prstGeom>
+          <a:noFill/>
+        </p:spPr>
+        <p:txBody>
+          <a:bodyPr wrap="none" rtlCol="0">
+            <a:spAutoFit/>
+          </a:bodyPr>
+          <a:lstStyle/>
+          <a:p>
+            <a:r>
+              <a:rPr lang="en-US" sz="1100" dirty="0"/>
+              <a:t>Table 1.</a:t>
             </a:r>
           </a:p>
         </p:txBody>

</xml_diff>